<commit_message>
Documentation and Slides Information page
</commit_message>
<xml_diff>
--- a/docs/Slides.pptx
+++ b/docs/Slides.pptx
@@ -4213,6 +4213,14 @@
             <a:endParaRPr lang="de-CH" dirty="0" smtClean="0"/>
           </a:p>
           <a:p>
+            <a:pPr lvl="2"/>
+            <a:r>
+              <a:rPr lang="de-CH" dirty="0" smtClean="0"/>
+              <a:t>Geplant war Formular, nach versuchen nicht verwendet und gelöscht</a:t>
+            </a:r>
+            <a:endParaRPr lang="de-CH" dirty="0" smtClean="0"/>
+          </a:p>
+          <a:p>
             <a:r>
               <a:rPr lang="de-CH" dirty="0" smtClean="0"/>
               <a:t>Task 11</a:t>
@@ -4225,7 +4233,7 @@
               <a:t>Google </a:t>
             </a:r>
             <a:r>
-              <a:rPr lang="de-CH" smtClean="0"/>
+              <a:rPr lang="de-CH" dirty="0" err="1" smtClean="0"/>
               <a:t>Maps</a:t>
             </a:r>
             <a:endParaRPr lang="de-CH" dirty="0"/>
@@ -4247,7 +4255,11 @@
           <a:bodyPr/>
           <a:lstStyle/>
           <a:p>
-            <a:endParaRPr lang="de-CH"/>
+            <a:r>
+              <a:rPr lang="de-CH" dirty="0" smtClean="0"/>
+              <a:t>Spezielle Tasks</a:t>
+            </a:r>
+            <a:endParaRPr lang="de-CH" dirty="0"/>
           </a:p>
         </p:txBody>
       </p:sp>

</xml_diff>